<commit_message>
Dodat istreniran model za detekciju deepfake video zapisa i refaktorisanje koda
</commit_message>
<xml_diff>
--- a/poster/poster.pptx
+++ b/poster/poster.pptx
@@ -7986,7 +7986,7 @@
         </p:nvSpPr>
         <p:spPr bwMode="auto">
           <a:xfrm>
-            <a:off x="22311358" y="10388749"/>
+            <a:off x="22311358" y="11008377"/>
             <a:ext cx="10058400" cy="784225"/>
           </a:xfrm>
           <a:prstGeom prst="rect">
@@ -8043,7 +8043,7 @@
         </p:nvSpPr>
         <p:spPr bwMode="auto">
           <a:xfrm>
-            <a:off x="22311358" y="11263729"/>
+            <a:off x="22311358" y="11927826"/>
             <a:ext cx="10058400" cy="3585597"/>
           </a:xfrm>
           <a:prstGeom prst="rect">
@@ -8190,7 +8190,7 @@
           <a:p>
             <a:pPr algn="just"/>
             <a:r>
-              <a:rPr lang="sr-Latn-RS" sz="3200">
+              <a:rPr lang="sr-Latn-RS" sz="3200" dirty="0">
                 <a:latin typeface="Titillium Web" panose="00000500000000000000" pitchFamily="2" charset="0"/>
                 <a:ea typeface="Open Sans" panose="020B0606030504020204" pitchFamily="34" charset="0"/>
                 <a:cs typeface="Open Sans" panose="020B0606030504020204" pitchFamily="34" charset="0"/>
@@ -8198,22 +8198,30 @@
               <a:t>Iteriranjem kroz epohe treniranja</a:t>
             </a:r>
             <a:r>
-              <a:rPr lang="en-US" sz="3200">
+              <a:rPr lang="en-US" sz="3200" dirty="0">
                 <a:latin typeface="Titillium Web" panose="00000500000000000000" pitchFamily="2" charset="0"/>
                 <a:ea typeface="Open Sans" panose="020B0606030504020204" pitchFamily="34" charset="0"/>
                 <a:cs typeface="Open Sans" panose="020B0606030504020204" pitchFamily="34" charset="0"/>
               </a:rPr>
-              <a:t> GAN mre</a:t>
-            </a:r>
-            <a:r>
-              <a:rPr lang="sr-Latn-RS" sz="3200">
+              <a:t> GAN </a:t>
+            </a:r>
+            <a:r>
+              <a:rPr lang="en-US" sz="3200" dirty="0" err="1">
                 <a:latin typeface="Titillium Web" panose="00000500000000000000" pitchFamily="2" charset="0"/>
                 <a:ea typeface="Open Sans" panose="020B0606030504020204" pitchFamily="34" charset="0"/>
                 <a:cs typeface="Open Sans" panose="020B0606030504020204" pitchFamily="34" charset="0"/>
               </a:rPr>
+              <a:t>mre</a:t>
+            </a:r>
+            <a:r>
+              <a:rPr lang="sr-Latn-RS" sz="3200" dirty="0">
+                <a:latin typeface="Titillium Web" panose="00000500000000000000" pitchFamily="2" charset="0"/>
+                <a:ea typeface="Open Sans" panose="020B0606030504020204" pitchFamily="34" charset="0"/>
+                <a:cs typeface="Open Sans" panose="020B0606030504020204" pitchFamily="34" charset="0"/>
+              </a:rPr>
               <a:t>že dolazimo do sve boljih rezultata koje možemo videti kroz LOSS vrednosti. Jednostavnim testiranjem došli smo do zaključka da je optimalan broj epoha pomoću kojih se dobija zadovoljavajuće rešenje oko 19000. Na toj vrednosti počinje da pada odnos boljih vrednosti u odnosu na trenutnu epohu.</a:t>
             </a:r>
-            <a:endParaRPr lang="en-US" sz="3200">
+            <a:endParaRPr lang="en-US" sz="3200" dirty="0">
               <a:latin typeface="Titillium Web" panose="00000500000000000000" pitchFamily="2" charset="0"/>
               <a:ea typeface="Open Sans" panose="020B0606030504020204" pitchFamily="34" charset="0"/>
               <a:cs typeface="Open Sans" panose="020B0606030504020204" pitchFamily="34" charset="0"/>
@@ -9080,7 +9088,7 @@
         <p:spPr bwMode="auto">
           <a:xfrm>
             <a:off x="22311358" y="8000231"/>
-            <a:ext cx="10058400" cy="2108269"/>
+            <a:ext cx="10058400" cy="3093154"/>
           </a:xfrm>
           <a:prstGeom prst="rect">
             <a:avLst/>
@@ -9226,7 +9234,7 @@
           <a:p>
             <a:pPr algn="just"/>
             <a:r>
-              <a:rPr lang="sr-Latn-RS" sz="3200">
+              <a:rPr lang="sr-Latn-RS" sz="3200" dirty="0">
                 <a:latin typeface="Titillium Web" panose="00000500000000000000" pitchFamily="2" charset="0"/>
                 <a:ea typeface="Open Sans" panose="020B0606030504020204" pitchFamily="34" charset="0"/>
                 <a:cs typeface="Open Sans" panose="020B0606030504020204" pitchFamily="34" charset="0"/>
@@ -9234,7 +9242,7 @@
               <a:t>Konvolutivne neuronske mreže su se koristile pri detekciji deepfake-a, a oslanjali smo se na </a:t>
             </a:r>
             <a:r>
-              <a:rPr lang="sr-Latn-RS" sz="3200" b="1">
+              <a:rPr lang="sr-Latn-RS" sz="3200" b="1" dirty="0">
                 <a:latin typeface="Titillium Web" panose="00000500000000000000" pitchFamily="2" charset="0"/>
                 <a:ea typeface="Open Sans" panose="020B0606030504020204" pitchFamily="34" charset="0"/>
                 <a:cs typeface="Open Sans" panose="020B0606030504020204" pitchFamily="34" charset="0"/>
@@ -9242,7 +9250,7 @@
               <a:t>MesoNET</a:t>
             </a:r>
             <a:r>
-              <a:rPr lang="sr-Latn-RS" sz="3200">
+              <a:rPr lang="sr-Latn-RS" sz="3200" dirty="0">
                 <a:latin typeface="Titillium Web" panose="00000500000000000000" pitchFamily="2" charset="0"/>
                 <a:ea typeface="Open Sans" panose="020B0606030504020204" pitchFamily="34" charset="0"/>
                 <a:cs typeface="Open Sans" panose="020B0606030504020204" pitchFamily="34" charset="0"/>
@@ -9250,7 +9258,7 @@
               <a:t> arhitekturu </a:t>
             </a:r>
             <a:r>
-              <a:rPr lang="en-US" sz="3200">
+              <a:rPr lang="en-US" sz="3200" dirty="0">
                 <a:latin typeface="Titillium Web" panose="00000500000000000000" pitchFamily="2" charset="0"/>
                 <a:ea typeface="Open Sans" panose="020B0606030504020204" pitchFamily="34" charset="0"/>
                 <a:cs typeface="Open Sans" panose="020B0606030504020204" pitchFamily="34" charset="0"/>
@@ -9258,7 +9266,7 @@
               <a:t>[</a:t>
             </a:r>
             <a:r>
-              <a:rPr lang="sr-Latn-RS" sz="3200">
+              <a:rPr lang="sr-Latn-RS" sz="3200" dirty="0">
                 <a:latin typeface="Titillium Web" panose="00000500000000000000" pitchFamily="2" charset="0"/>
                 <a:ea typeface="Open Sans" panose="020B0606030504020204" pitchFamily="34" charset="0"/>
                 <a:cs typeface="Open Sans" panose="020B0606030504020204" pitchFamily="34" charset="0"/>
@@ -9266,7 +9274,7 @@
               <a:t>3</a:t>
             </a:r>
             <a:r>
-              <a:rPr lang="en-US" sz="3200">
+              <a:rPr lang="en-US" sz="3200" dirty="0">
                 <a:latin typeface="Titillium Web" panose="00000500000000000000" pitchFamily="2" charset="0"/>
                 <a:ea typeface="Open Sans" panose="020B0606030504020204" pitchFamily="34" charset="0"/>
                 <a:cs typeface="Open Sans" panose="020B0606030504020204" pitchFamily="34" charset="0"/>
@@ -9274,7 +9282,7 @@
               <a:t>]</a:t>
             </a:r>
             <a:r>
-              <a:rPr lang="sr-Latn-RS" sz="3200">
+              <a:rPr lang="sr-Latn-RS" sz="3200" dirty="0">
                 <a:latin typeface="Titillium Web" panose="00000500000000000000" pitchFamily="2" charset="0"/>
                 <a:ea typeface="Open Sans" panose="020B0606030504020204" pitchFamily="34" charset="0"/>
                 <a:cs typeface="Open Sans" panose="020B0606030504020204" pitchFamily="34" charset="0"/>
@@ -9282,7 +9290,7 @@
               <a:t>, konkretno koristeći </a:t>
             </a:r>
             <a:r>
-              <a:rPr lang="sr-Latn-RS" sz="3200" b="1">
+              <a:rPr lang="sr-Latn-RS" sz="3200" b="1" dirty="0">
                 <a:latin typeface="Titillium Web" panose="00000500000000000000" pitchFamily="2" charset="0"/>
                 <a:ea typeface="Open Sans" panose="020B0606030504020204" pitchFamily="34" charset="0"/>
                 <a:cs typeface="Open Sans" panose="020B0606030504020204" pitchFamily="34" charset="0"/>
@@ -9290,12 +9298,100 @@
               <a:t>Meso-4</a:t>
             </a:r>
             <a:r>
-              <a:rPr lang="sr-Latn-RS" sz="3200">
+              <a:rPr lang="sr-Latn-RS" sz="3200" dirty="0">
                 <a:latin typeface="Titillium Web" panose="00000500000000000000" pitchFamily="2" charset="0"/>
                 <a:ea typeface="Open Sans" panose="020B0606030504020204" pitchFamily="34" charset="0"/>
                 <a:cs typeface="Open Sans" panose="020B0606030504020204" pitchFamily="34" charset="0"/>
               </a:rPr>
               <a:t> konvolucione neuronske mreže. </a:t>
+            </a:r>
+            <a:r>
+              <a:rPr lang="en-US" sz="3200" dirty="0" err="1">
+                <a:latin typeface="Titillium Web" panose="00000500000000000000" pitchFamily="2" charset="0"/>
+                <a:ea typeface="Open Sans" panose="020B0606030504020204" pitchFamily="34" charset="0"/>
+                <a:cs typeface="Open Sans" panose="020B0606030504020204" pitchFamily="34" charset="0"/>
+              </a:rPr>
+              <a:t>Klasifikacija</a:t>
+            </a:r>
+            <a:r>
+              <a:rPr lang="en-US" sz="3200" dirty="0">
+                <a:latin typeface="Titillium Web" panose="00000500000000000000" pitchFamily="2" charset="0"/>
+                <a:ea typeface="Open Sans" panose="020B0606030504020204" pitchFamily="34" charset="0"/>
+                <a:cs typeface="Open Sans" panose="020B0606030504020204" pitchFamily="34" charset="0"/>
+              </a:rPr>
+              <a:t> </a:t>
+            </a:r>
+            <a:r>
+              <a:rPr lang="en-US" sz="3200" dirty="0" err="1">
+                <a:latin typeface="Titillium Web" panose="00000500000000000000" pitchFamily="2" charset="0"/>
+                <a:ea typeface="Open Sans" panose="020B0606030504020204" pitchFamily="34" charset="0"/>
+                <a:cs typeface="Open Sans" panose="020B0606030504020204" pitchFamily="34" charset="0"/>
+              </a:rPr>
+              <a:t>realnih</a:t>
+            </a:r>
+            <a:r>
+              <a:rPr lang="en-US" sz="3200" dirty="0">
+                <a:latin typeface="Titillium Web" panose="00000500000000000000" pitchFamily="2" charset="0"/>
+                <a:ea typeface="Open Sans" panose="020B0606030504020204" pitchFamily="34" charset="0"/>
+                <a:cs typeface="Open Sans" panose="020B0606030504020204" pitchFamily="34" charset="0"/>
+              </a:rPr>
+              <a:t> </a:t>
+            </a:r>
+            <a:r>
+              <a:rPr lang="en-US" sz="3200" dirty="0" err="1">
+                <a:latin typeface="Titillium Web" panose="00000500000000000000" pitchFamily="2" charset="0"/>
+                <a:ea typeface="Open Sans" panose="020B0606030504020204" pitchFamily="34" charset="0"/>
+                <a:cs typeface="Open Sans" panose="020B0606030504020204" pitchFamily="34" charset="0"/>
+              </a:rPr>
+              <a:t>i</a:t>
+            </a:r>
+            <a:r>
+              <a:rPr lang="en-US" sz="3200" dirty="0">
+                <a:latin typeface="Titillium Web" panose="00000500000000000000" pitchFamily="2" charset="0"/>
+                <a:ea typeface="Open Sans" panose="020B0606030504020204" pitchFamily="34" charset="0"/>
+                <a:cs typeface="Open Sans" panose="020B0606030504020204" pitchFamily="34" charset="0"/>
+              </a:rPr>
+              <a:t> </a:t>
+            </a:r>
+            <a:r>
+              <a:rPr lang="en-US" sz="3200" dirty="0" err="1">
+                <a:latin typeface="Titillium Web" panose="00000500000000000000" pitchFamily="2" charset="0"/>
+                <a:ea typeface="Open Sans" panose="020B0606030504020204" pitchFamily="34" charset="0"/>
+                <a:cs typeface="Open Sans" panose="020B0606030504020204" pitchFamily="34" charset="0"/>
+              </a:rPr>
+              <a:t>deepfake</a:t>
+            </a:r>
+            <a:r>
+              <a:rPr lang="en-US" sz="3200" dirty="0">
+                <a:latin typeface="Titillium Web" panose="00000500000000000000" pitchFamily="2" charset="0"/>
+                <a:ea typeface="Open Sans" panose="020B0606030504020204" pitchFamily="34" charset="0"/>
+                <a:cs typeface="Open Sans" panose="020B0606030504020204" pitchFamily="34" charset="0"/>
+              </a:rPr>
+              <a:t> video </a:t>
+            </a:r>
+            <a:r>
+              <a:rPr lang="en-US" sz="3200" dirty="0" err="1">
+                <a:latin typeface="Titillium Web" panose="00000500000000000000" pitchFamily="2" charset="0"/>
+                <a:ea typeface="Open Sans" panose="020B0606030504020204" pitchFamily="34" charset="0"/>
+                <a:cs typeface="Open Sans" panose="020B0606030504020204" pitchFamily="34" charset="0"/>
+              </a:rPr>
+              <a:t>zapisa</a:t>
+            </a:r>
+            <a:r>
+              <a:rPr lang="en-US" sz="3200" dirty="0">
+                <a:latin typeface="Titillium Web" panose="00000500000000000000" pitchFamily="2" charset="0"/>
+                <a:ea typeface="Open Sans" panose="020B0606030504020204" pitchFamily="34" charset="0"/>
+                <a:cs typeface="Open Sans" panose="020B0606030504020204" pitchFamily="34" charset="0"/>
+              </a:rPr>
+              <a:t> </a:t>
+            </a:r>
+            <a:r>
+              <a:rPr lang="sr-Latn-RS" sz="3200" dirty="0">
+                <a:latin typeface="Titillium Web" panose="00000500000000000000" pitchFamily="2" charset="0"/>
+                <a:ea typeface="Open Sans" panose="020B0606030504020204" pitchFamily="34" charset="0"/>
+                <a:cs typeface="Open Sans" panose="020B0606030504020204" pitchFamily="34" charset="0"/>
+              </a:rPr>
+              <a:t>će biti predstavljena kao binaran format, gde je 0 deepfake, a 1 realna klasa.</a:t>
             </a:r>
           </a:p>
         </p:txBody>
@@ -9554,13 +9650,13 @@
           <p:nvPr>
             <p:extLst>
               <p:ext uri="{D42A27DB-BD31-4B8C-83A1-F6EECF244321}">
-                <p14:modId xmlns:p14="http://schemas.microsoft.com/office/powerpoint/2010/main" val="2469738247"/>
+                <p14:modId xmlns:p14="http://schemas.microsoft.com/office/powerpoint/2010/main" val="2162476996"/>
               </p:ext>
             </p:extLst>
           </p:nvPr>
         </p:nvGraphicFramePr>
         <p:xfrm>
-          <a:off x="22311358" y="15144853"/>
+          <a:off x="22311358" y="15552416"/>
           <a:ext cx="10058400" cy="6017895"/>
         </p:xfrm>
         <a:graphic>
@@ -9585,7 +9681,7 @@
         </p:nvSpPr>
         <p:spPr bwMode="auto">
           <a:xfrm>
-            <a:off x="33101276" y="20802927"/>
+            <a:off x="33101276" y="23898608"/>
             <a:ext cx="10058400" cy="784225"/>
           </a:xfrm>
           <a:prstGeom prst="rect">
@@ -9642,7 +9738,7 @@
         </p:nvSpPr>
         <p:spPr bwMode="auto">
           <a:xfrm>
-            <a:off x="33101276" y="21677907"/>
+            <a:off x="33101276" y="24773588"/>
             <a:ext cx="10058400" cy="2600712"/>
           </a:xfrm>
           <a:prstGeom prst="rect">
@@ -9895,7 +9991,7 @@
         </p:nvSpPr>
         <p:spPr bwMode="auto">
           <a:xfrm>
-            <a:off x="33101276" y="13354598"/>
+            <a:off x="33101276" y="16940551"/>
             <a:ext cx="10058400" cy="784225"/>
           </a:xfrm>
           <a:prstGeom prst="rect">
@@ -9952,7 +10048,7 @@
         </p:nvSpPr>
         <p:spPr bwMode="auto">
           <a:xfrm>
-            <a:off x="33101276" y="14209559"/>
+            <a:off x="33101276" y="17795512"/>
             <a:ext cx="10058400" cy="6047809"/>
           </a:xfrm>
           <a:prstGeom prst="rect">
@@ -10099,7 +10195,7 @@
           <a:p>
             <a:pPr algn="just"/>
             <a:r>
-              <a:rPr lang="sr-Latn-RS" sz="3200">
+              <a:rPr lang="sr-Latn-RS" sz="3200" dirty="0">
                 <a:latin typeface="Titillium Web" panose="00000500000000000000" pitchFamily="2" charset="0"/>
                 <a:ea typeface="Open Sans" panose="020B0606030504020204" pitchFamily="34" charset="0"/>
                 <a:cs typeface="Open Sans" panose="020B0606030504020204" pitchFamily="34" charset="0"/>
@@ -10110,7 +10206,7 @@
           <a:p>
             <a:pPr algn="just"/>
             <a:r>
-              <a:rPr lang="sr-Latn-RS" sz="3200">
+              <a:rPr lang="sr-Latn-RS" sz="3200" dirty="0">
                 <a:latin typeface="Titillium Web" panose="00000500000000000000" pitchFamily="2" charset="0"/>
                 <a:ea typeface="Open Sans" panose="020B0606030504020204" pitchFamily="34" charset="0"/>
                 <a:cs typeface="Open Sans" panose="020B0606030504020204" pitchFamily="34" charset="0"/>
@@ -10118,7 +10214,7 @@
               <a:t>Za potrebe detekcije deepfake video zapisa prilikom treniranja korišćen je javno dostupan skup podataka koji je izvučen iz rada o MesoNET arhitekturi </a:t>
             </a:r>
             <a:r>
-              <a:rPr lang="en-US" sz="3200">
+              <a:rPr lang="en-US" sz="3200" dirty="0">
                 <a:latin typeface="Titillium Web" panose="00000500000000000000" pitchFamily="2" charset="0"/>
                 <a:ea typeface="Open Sans" panose="020B0606030504020204" pitchFamily="34" charset="0"/>
                 <a:cs typeface="Open Sans" panose="020B0606030504020204" pitchFamily="34" charset="0"/>
@@ -10126,7 +10222,7 @@
               <a:t>[</a:t>
             </a:r>
             <a:r>
-              <a:rPr lang="sr-Latn-RS" sz="3200">
+              <a:rPr lang="sr-Latn-RS" sz="3200" dirty="0">
                 <a:latin typeface="Titillium Web" panose="00000500000000000000" pitchFamily="2" charset="0"/>
                 <a:ea typeface="Open Sans" panose="020B0606030504020204" pitchFamily="34" charset="0"/>
                 <a:cs typeface="Open Sans" panose="020B0606030504020204" pitchFamily="34" charset="0"/>
@@ -10134,7 +10230,7 @@
               <a:t>4</a:t>
             </a:r>
             <a:r>
-              <a:rPr lang="en-US" sz="3200">
+              <a:rPr lang="en-US" sz="3200" dirty="0">
                 <a:latin typeface="Titillium Web" panose="00000500000000000000" pitchFamily="2" charset="0"/>
                 <a:ea typeface="Open Sans" panose="020B0606030504020204" pitchFamily="34" charset="0"/>
                 <a:cs typeface="Open Sans" panose="020B0606030504020204" pitchFamily="34" charset="0"/>
@@ -10142,7 +10238,7 @@
               <a:t>]</a:t>
             </a:r>
             <a:r>
-              <a:rPr lang="sr-Latn-RS" sz="3200">
+              <a:rPr lang="sr-Latn-RS" sz="3200" dirty="0">
                 <a:latin typeface="Titillium Web" panose="00000500000000000000" pitchFamily="2" charset="0"/>
                 <a:ea typeface="Open Sans" panose="020B0606030504020204" pitchFamily="34" charset="0"/>
                 <a:cs typeface="Open Sans" panose="020B0606030504020204" pitchFamily="34" charset="0"/>
@@ -10153,7 +10249,7 @@
           <a:p>
             <a:pPr algn="just"/>
             <a:r>
-              <a:rPr lang="sr-Latn-RS" sz="3200">
+              <a:rPr lang="sr-Latn-RS" sz="3200" dirty="0">
                 <a:latin typeface="Titillium Web" panose="00000500000000000000" pitchFamily="2" charset="0"/>
                 <a:ea typeface="Open Sans" panose="020B0606030504020204" pitchFamily="34" charset="0"/>
                 <a:cs typeface="Open Sans" panose="020B0606030504020204" pitchFamily="34" charset="0"/>
@@ -10179,8 +10275,8 @@
         </p:nvSpPr>
         <p:spPr bwMode="auto">
           <a:xfrm>
-            <a:off x="22311358" y="21552307"/>
-            <a:ext cx="10058400" cy="2108269"/>
+            <a:off x="22311358" y="21669688"/>
+            <a:ext cx="10058400" cy="6047809"/>
           </a:xfrm>
           <a:prstGeom prst="rect">
             <a:avLst/>
@@ -10326,7 +10422,7 @@
           <a:p>
             <a:pPr algn="just"/>
             <a:r>
-              <a:rPr lang="sr-Latn-RS" sz="3200">
+              <a:rPr lang="sr-Latn-RS" sz="3200" dirty="0">
                 <a:latin typeface="Titillium Web" panose="00000500000000000000" pitchFamily="2" charset="0"/>
                 <a:ea typeface="Open Sans" panose="020B0606030504020204" pitchFamily="34" charset="0"/>
                 <a:cs typeface="Open Sans" panose="020B0606030504020204" pitchFamily="34" charset="0"/>
@@ -10334,7 +10430,7 @@
               <a:t>Prilikom treniranja Meso-4 mreže za detekciju deepfake video zapisa došli smo do zaključka da je optimalan broj epoha za treniranje iste oko </a:t>
             </a:r>
             <a:r>
-              <a:rPr lang="en-US" sz="3200">
+              <a:rPr lang="en-US" sz="3200" dirty="0">
                 <a:latin typeface="Titillium Web" panose="00000500000000000000" pitchFamily="2" charset="0"/>
                 <a:ea typeface="Open Sans" panose="020B0606030504020204" pitchFamily="34" charset="0"/>
                 <a:cs typeface="Open Sans" panose="020B0606030504020204" pitchFamily="34" charset="0"/>
@@ -10342,13 +10438,290 @@
               <a:t>84</a:t>
             </a:r>
             <a:r>
-              <a:rPr lang="sr-Latn-RS" sz="3200">
+              <a:rPr lang="sr-Latn-RS" sz="3200" dirty="0">
                 <a:latin typeface="Titillium Web" panose="00000500000000000000" pitchFamily="2" charset="0"/>
                 <a:ea typeface="Open Sans" panose="020B0606030504020204" pitchFamily="34" charset="0"/>
                 <a:cs typeface="Open Sans" panose="020B0606030504020204" pitchFamily="34" charset="0"/>
               </a:rPr>
               <a:t>, konkretno za skup podataka koji je korišćen, a opisan u nastavku.</a:t>
             </a:r>
+            <a:r>
+              <a:rPr lang="en-US" sz="3200" dirty="0">
+                <a:latin typeface="Titillium Web" panose="00000500000000000000" pitchFamily="2" charset="0"/>
+                <a:ea typeface="Open Sans" panose="020B0606030504020204" pitchFamily="34" charset="0"/>
+                <a:cs typeface="Open Sans" panose="020B0606030504020204" pitchFamily="34" charset="0"/>
+              </a:rPr>
+              <a:t> </a:t>
+            </a:r>
+            <a:r>
+              <a:rPr lang="en-US" sz="3200" dirty="0" err="1">
+                <a:latin typeface="Titillium Web" panose="00000500000000000000" pitchFamily="2" charset="0"/>
+                <a:ea typeface="Open Sans" panose="020B0606030504020204" pitchFamily="34" charset="0"/>
+                <a:cs typeface="Open Sans" panose="020B0606030504020204" pitchFamily="34" charset="0"/>
+              </a:rPr>
+              <a:t>Najmanja</a:t>
+            </a:r>
+            <a:r>
+              <a:rPr lang="en-US" sz="3200" dirty="0">
+                <a:latin typeface="Titillium Web" panose="00000500000000000000" pitchFamily="2" charset="0"/>
+                <a:ea typeface="Open Sans" panose="020B0606030504020204" pitchFamily="34" charset="0"/>
+                <a:cs typeface="Open Sans" panose="020B0606030504020204" pitchFamily="34" charset="0"/>
+              </a:rPr>
+              <a:t> </a:t>
+            </a:r>
+            <a:r>
+              <a:rPr lang="en-US" sz="3200" dirty="0" err="1">
+                <a:latin typeface="Titillium Web" panose="00000500000000000000" pitchFamily="2" charset="0"/>
+                <a:ea typeface="Open Sans" panose="020B0606030504020204" pitchFamily="34" charset="0"/>
+                <a:cs typeface="Open Sans" panose="020B0606030504020204" pitchFamily="34" charset="0"/>
+              </a:rPr>
+              <a:t>gre</a:t>
+            </a:r>
+            <a:r>
+              <a:rPr lang="sr-Latn-RS" sz="3200" dirty="0">
+                <a:latin typeface="Titillium Web" panose="00000500000000000000" pitchFamily="2" charset="0"/>
+                <a:ea typeface="Open Sans" panose="020B0606030504020204" pitchFamily="34" charset="0"/>
+                <a:cs typeface="Open Sans" panose="020B0606030504020204" pitchFamily="34" charset="0"/>
+              </a:rPr>
+              <a:t>ška kvadrata srednjih vrednosti (skr. </a:t>
+            </a:r>
+            <a:r>
+              <a:rPr lang="sr-Latn-RS" sz="3200" b="1" dirty="0">
+                <a:latin typeface="Titillium Web" panose="00000500000000000000" pitchFamily="2" charset="0"/>
+                <a:ea typeface="Open Sans" panose="020B0606030504020204" pitchFamily="34" charset="0"/>
+                <a:cs typeface="Open Sans" panose="020B0606030504020204" pitchFamily="34" charset="0"/>
+              </a:rPr>
+              <a:t>MSE</a:t>
+            </a:r>
+            <a:r>
+              <a:rPr lang="sr-Latn-RS" sz="3200" dirty="0">
+                <a:latin typeface="Titillium Web" panose="00000500000000000000" pitchFamily="2" charset="0"/>
+                <a:ea typeface="Open Sans" panose="020B0606030504020204" pitchFamily="34" charset="0"/>
+                <a:cs typeface="Open Sans" panose="020B0606030504020204" pitchFamily="34" charset="0"/>
+              </a:rPr>
+              <a:t>) je </a:t>
+            </a:r>
+            <a:r>
+              <a:rPr lang="sr-Latn-RS" sz="3200" i="1" dirty="0">
+                <a:latin typeface="Titillium Web" panose="00000500000000000000" pitchFamily="2" charset="0"/>
+                <a:ea typeface="Open Sans" panose="020B0606030504020204" pitchFamily="34" charset="0"/>
+                <a:cs typeface="Open Sans" panose="020B0606030504020204" pitchFamily="34" charset="0"/>
+              </a:rPr>
+              <a:t>0.00638</a:t>
+            </a:r>
+            <a:r>
+              <a:rPr lang="sr-Latn-RS" sz="3200" dirty="0">
+                <a:latin typeface="Titillium Web" panose="00000500000000000000" pitchFamily="2" charset="0"/>
+                <a:ea typeface="Open Sans" panose="020B0606030504020204" pitchFamily="34" charset="0"/>
+                <a:cs typeface="Open Sans" panose="020B0606030504020204" pitchFamily="34" charset="0"/>
+              </a:rPr>
+              <a:t>, a tačnost (eng. </a:t>
+            </a:r>
+            <a:r>
+              <a:rPr lang="sr-Latn-RS" sz="3200" b="1" dirty="0">
+                <a:latin typeface="Titillium Web" panose="00000500000000000000" pitchFamily="2" charset="0"/>
+                <a:ea typeface="Open Sans" panose="020B0606030504020204" pitchFamily="34" charset="0"/>
+                <a:cs typeface="Open Sans" panose="020B0606030504020204" pitchFamily="34" charset="0"/>
+              </a:rPr>
+              <a:t>accuracy</a:t>
+            </a:r>
+            <a:r>
+              <a:rPr lang="sr-Latn-RS" sz="3200" dirty="0">
+                <a:latin typeface="Titillium Web" panose="00000500000000000000" pitchFamily="2" charset="0"/>
+                <a:ea typeface="Open Sans" panose="020B0606030504020204" pitchFamily="34" charset="0"/>
+                <a:cs typeface="Open Sans" panose="020B0606030504020204" pitchFamily="34" charset="0"/>
+              </a:rPr>
+              <a:t>) je</a:t>
+            </a:r>
+            <a:r>
+              <a:rPr lang="sr-Latn-RS" sz="3200" i="1" dirty="0">
+                <a:latin typeface="Titillium Web" panose="00000500000000000000" pitchFamily="2" charset="0"/>
+                <a:ea typeface="Open Sans" panose="020B0606030504020204" pitchFamily="34" charset="0"/>
+                <a:cs typeface="Open Sans" panose="020B0606030504020204" pitchFamily="34" charset="0"/>
+              </a:rPr>
+              <a:t> 0.9918</a:t>
+            </a:r>
+            <a:r>
+              <a:rPr lang="sr-Latn-RS" sz="3200" dirty="0">
+                <a:latin typeface="Titillium Web" panose="00000500000000000000" pitchFamily="2" charset="0"/>
+                <a:ea typeface="Open Sans" panose="020B0606030504020204" pitchFamily="34" charset="0"/>
+                <a:cs typeface="Open Sans" panose="020B0606030504020204" pitchFamily="34" charset="0"/>
+              </a:rPr>
+              <a:t>. </a:t>
+            </a:r>
+            <a:r>
+              <a:rPr lang="en-US" sz="3200" dirty="0" err="1">
+                <a:latin typeface="Titillium Web" panose="00000500000000000000" pitchFamily="2" charset="0"/>
+                <a:ea typeface="Open Sans" panose="020B0606030504020204" pitchFamily="34" charset="0"/>
+                <a:cs typeface="Open Sans" panose="020B0606030504020204" pitchFamily="34" charset="0"/>
+              </a:rPr>
+              <a:t>Evaluaciju</a:t>
+            </a:r>
+            <a:r>
+              <a:rPr lang="en-US" sz="3200" dirty="0">
+                <a:latin typeface="Titillium Web" panose="00000500000000000000" pitchFamily="2" charset="0"/>
+                <a:ea typeface="Open Sans" panose="020B0606030504020204" pitchFamily="34" charset="0"/>
+                <a:cs typeface="Open Sans" panose="020B0606030504020204" pitchFamily="34" charset="0"/>
+              </a:rPr>
+              <a:t> </a:t>
+            </a:r>
+            <a:r>
+              <a:rPr lang="en-US" sz="3200" dirty="0" err="1">
+                <a:latin typeface="Titillium Web" panose="00000500000000000000" pitchFamily="2" charset="0"/>
+                <a:ea typeface="Open Sans" panose="020B0606030504020204" pitchFamily="34" charset="0"/>
+                <a:cs typeface="Open Sans" panose="020B0606030504020204" pitchFamily="34" charset="0"/>
+              </a:rPr>
+              <a:t>ovog</a:t>
+            </a:r>
+            <a:r>
+              <a:rPr lang="en-US" sz="3200" dirty="0">
+                <a:latin typeface="Titillium Web" panose="00000500000000000000" pitchFamily="2" charset="0"/>
+                <a:ea typeface="Open Sans" panose="020B0606030504020204" pitchFamily="34" charset="0"/>
+                <a:cs typeface="Open Sans" panose="020B0606030504020204" pitchFamily="34" charset="0"/>
+              </a:rPr>
+              <a:t> </a:t>
+            </a:r>
+            <a:r>
+              <a:rPr lang="en-US" sz="3200" dirty="0" err="1">
+                <a:latin typeface="Titillium Web" panose="00000500000000000000" pitchFamily="2" charset="0"/>
+                <a:ea typeface="Open Sans" panose="020B0606030504020204" pitchFamily="34" charset="0"/>
+                <a:cs typeface="Open Sans" panose="020B0606030504020204" pitchFamily="34" charset="0"/>
+              </a:rPr>
+              <a:t>modela</a:t>
+            </a:r>
+            <a:r>
+              <a:rPr lang="en-US" sz="3200" dirty="0">
+                <a:latin typeface="Titillium Web" panose="00000500000000000000" pitchFamily="2" charset="0"/>
+                <a:ea typeface="Open Sans" panose="020B0606030504020204" pitchFamily="34" charset="0"/>
+                <a:cs typeface="Open Sans" panose="020B0606030504020204" pitchFamily="34" charset="0"/>
+              </a:rPr>
+              <a:t> </a:t>
+            </a:r>
+            <a:r>
+              <a:rPr lang="en-US" sz="3200" dirty="0" err="1">
+                <a:latin typeface="Titillium Web" panose="00000500000000000000" pitchFamily="2" charset="0"/>
+                <a:ea typeface="Open Sans" panose="020B0606030504020204" pitchFamily="34" charset="0"/>
+                <a:cs typeface="Open Sans" panose="020B0606030504020204" pitchFamily="34" charset="0"/>
+              </a:rPr>
+              <a:t>smo</a:t>
+            </a:r>
+            <a:r>
+              <a:rPr lang="en-US" sz="3200" dirty="0">
+                <a:latin typeface="Titillium Web" panose="00000500000000000000" pitchFamily="2" charset="0"/>
+                <a:ea typeface="Open Sans" panose="020B0606030504020204" pitchFamily="34" charset="0"/>
+                <a:cs typeface="Open Sans" panose="020B0606030504020204" pitchFamily="34" charset="0"/>
+              </a:rPr>
+              <a:t> </a:t>
+            </a:r>
+            <a:r>
+              <a:rPr lang="en-US" sz="3200" dirty="0" err="1">
+                <a:latin typeface="Titillium Web" panose="00000500000000000000" pitchFamily="2" charset="0"/>
+                <a:ea typeface="Open Sans" panose="020B0606030504020204" pitchFamily="34" charset="0"/>
+                <a:cs typeface="Open Sans" panose="020B0606030504020204" pitchFamily="34" charset="0"/>
+              </a:rPr>
+              <a:t>tako</a:t>
+            </a:r>
+            <a:r>
+              <a:rPr lang="sr-Latn-RS" sz="3200" dirty="0">
+                <a:latin typeface="Titillium Web" panose="00000500000000000000" pitchFamily="2" charset="0"/>
+                <a:ea typeface="Open Sans" panose="020B0606030504020204" pitchFamily="34" charset="0"/>
+                <a:cs typeface="Open Sans" panose="020B0606030504020204" pitchFamily="34" charset="0"/>
+              </a:rPr>
+              <a:t>đe vršili i nad našim deepfake video zapisima </a:t>
+            </a:r>
+            <a:r>
+              <a:rPr lang="en-US" sz="3200" dirty="0" err="1">
+                <a:latin typeface="Titillium Web" panose="00000500000000000000" pitchFamily="2" charset="0"/>
+                <a:ea typeface="Open Sans" panose="020B0606030504020204" pitchFamily="34" charset="0"/>
+                <a:cs typeface="Open Sans" panose="020B0606030504020204" pitchFamily="34" charset="0"/>
+              </a:rPr>
+              <a:t>gde</a:t>
+            </a:r>
+            <a:r>
+              <a:rPr lang="en-US" sz="3200" dirty="0">
+                <a:latin typeface="Titillium Web" panose="00000500000000000000" pitchFamily="2" charset="0"/>
+                <a:ea typeface="Open Sans" panose="020B0606030504020204" pitchFamily="34" charset="0"/>
+                <a:cs typeface="Open Sans" panose="020B0606030504020204" pitchFamily="34" charset="0"/>
+              </a:rPr>
+              <a:t> je </a:t>
+            </a:r>
+            <a:r>
+              <a:rPr lang="en-US" sz="3200" dirty="0" err="1">
+                <a:latin typeface="Titillium Web" panose="00000500000000000000" pitchFamily="2" charset="0"/>
+                <a:ea typeface="Open Sans" panose="020B0606030504020204" pitchFamily="34" charset="0"/>
+                <a:cs typeface="Open Sans" panose="020B0606030504020204" pitchFamily="34" charset="0"/>
+              </a:rPr>
+              <a:t>dava</a:t>
+            </a:r>
+            <a:r>
+              <a:rPr lang="sr-Latn-RS" sz="3200" dirty="0">
+                <a:latin typeface="Titillium Web" panose="00000500000000000000" pitchFamily="2" charset="0"/>
+                <a:ea typeface="Open Sans" panose="020B0606030504020204" pitchFamily="34" charset="0"/>
+                <a:cs typeface="Open Sans" panose="020B0606030504020204" pitchFamily="34" charset="0"/>
+              </a:rPr>
+              <a:t>o srednju vrednost predikcija pojedinačnih frejmova video zapisa. U velik broj slučajeva je davao predikciju koja je manja od 0.8 što pokazuje da ovaj model</a:t>
+            </a:r>
+            <a:r>
+              <a:rPr lang="en-US" sz="3200" dirty="0">
+                <a:latin typeface="Titillium Web" panose="00000500000000000000" pitchFamily="2" charset="0"/>
+                <a:ea typeface="Open Sans" panose="020B0606030504020204" pitchFamily="34" charset="0"/>
+                <a:cs typeface="Open Sans" panose="020B0606030504020204" pitchFamily="34" charset="0"/>
+              </a:rPr>
+              <a:t> </a:t>
+            </a:r>
+            <a:r>
+              <a:rPr lang="sr-Latn-RS" sz="3200" dirty="0">
+                <a:latin typeface="Titillium Web" panose="00000500000000000000" pitchFamily="2" charset="0"/>
+                <a:ea typeface="Open Sans" panose="020B0606030504020204" pitchFamily="34" charset="0"/>
+                <a:cs typeface="Open Sans" panose="020B0606030504020204" pitchFamily="34" charset="0"/>
+              </a:rPr>
+              <a:t>može da prepozna i da pokaže kvalitet</a:t>
+            </a:r>
+            <a:r>
+              <a:rPr lang="en-US" sz="3200" dirty="0">
+                <a:latin typeface="Titillium Web" panose="00000500000000000000" pitchFamily="2" charset="0"/>
+                <a:ea typeface="Open Sans" panose="020B0606030504020204" pitchFamily="34" charset="0"/>
+                <a:cs typeface="Open Sans" panose="020B0606030504020204" pitchFamily="34" charset="0"/>
+              </a:rPr>
+              <a:t> </a:t>
+            </a:r>
+            <a:r>
+              <a:rPr lang="en-US" sz="3200" dirty="0" err="1">
+                <a:latin typeface="Titillium Web" panose="00000500000000000000" pitchFamily="2" charset="0"/>
+                <a:ea typeface="Open Sans" panose="020B0606030504020204" pitchFamily="34" charset="0"/>
+                <a:cs typeface="Open Sans" panose="020B0606030504020204" pitchFamily="34" charset="0"/>
+              </a:rPr>
+              <a:t>deepfake</a:t>
+            </a:r>
+            <a:r>
+              <a:rPr lang="en-US" sz="3200" dirty="0">
+                <a:latin typeface="Titillium Web" panose="00000500000000000000" pitchFamily="2" charset="0"/>
+                <a:ea typeface="Open Sans" panose="020B0606030504020204" pitchFamily="34" charset="0"/>
+                <a:cs typeface="Open Sans" panose="020B0606030504020204" pitchFamily="34" charset="0"/>
+              </a:rPr>
+              <a:t> video </a:t>
+            </a:r>
+            <a:r>
+              <a:rPr lang="en-US" sz="3200" dirty="0" err="1">
+                <a:latin typeface="Titillium Web" panose="00000500000000000000" pitchFamily="2" charset="0"/>
+                <a:ea typeface="Open Sans" panose="020B0606030504020204" pitchFamily="34" charset="0"/>
+                <a:cs typeface="Open Sans" panose="020B0606030504020204" pitchFamily="34" charset="0"/>
+              </a:rPr>
+              <a:t>zapisa</a:t>
+            </a:r>
+            <a:r>
+              <a:rPr lang="en-US" sz="3200" dirty="0">
+                <a:latin typeface="Titillium Web" panose="00000500000000000000" pitchFamily="2" charset="0"/>
+                <a:ea typeface="Open Sans" panose="020B0606030504020204" pitchFamily="34" charset="0"/>
+                <a:cs typeface="Open Sans" panose="020B0606030504020204" pitchFamily="34" charset="0"/>
+              </a:rPr>
+              <a:t>. </a:t>
+            </a:r>
+            <a:endParaRPr lang="sr-Latn-RS" sz="3200" dirty="0">
+              <a:latin typeface="Titillium Web" panose="00000500000000000000" pitchFamily="2" charset="0"/>
+              <a:ea typeface="Open Sans" panose="020B0606030504020204" pitchFamily="34" charset="0"/>
+              <a:cs typeface="Open Sans" panose="020B0606030504020204" pitchFamily="34" charset="0"/>
+            </a:endParaRPr>
           </a:p>
         </p:txBody>
       </p:sp>
@@ -10365,14 +10738,14 @@
           <p:nvPr>
             <p:extLst>
               <p:ext uri="{D42A27DB-BD31-4B8C-83A1-F6EECF244321}">
-                <p14:modId xmlns:p14="http://schemas.microsoft.com/office/powerpoint/2010/main" val="3170917687"/>
+                <p14:modId xmlns:p14="http://schemas.microsoft.com/office/powerpoint/2010/main" val="2761072136"/>
               </p:ext>
             </p:extLst>
           </p:nvPr>
         </p:nvGraphicFramePr>
         <p:xfrm>
-          <a:off x="22311358" y="24106253"/>
-          <a:ext cx="10058400" cy="6017895"/>
+          <a:off x="33993851" y="7181151"/>
+          <a:ext cx="8071888" cy="4702335"/>
         </p:xfrm>
         <a:graphic>
           <a:graphicData uri="http://schemas.openxmlformats.org/drawingml/2006/chart">
@@ -10393,14 +10766,14 @@
           <p:nvPr>
             <p:extLst>
               <p:ext uri="{D42A27DB-BD31-4B8C-83A1-F6EECF244321}">
-                <p14:modId xmlns:p14="http://schemas.microsoft.com/office/powerpoint/2010/main" val="3849896171"/>
+                <p14:modId xmlns:p14="http://schemas.microsoft.com/office/powerpoint/2010/main" val="33043660"/>
               </p:ext>
             </p:extLst>
           </p:nvPr>
         </p:nvGraphicFramePr>
         <p:xfrm>
-          <a:off x="33101276" y="6971476"/>
-          <a:ext cx="10058400" cy="6017895"/>
+          <a:off x="33696326" y="12161398"/>
+          <a:ext cx="8666939" cy="4598346"/>
         </p:xfrm>
         <a:graphic>
           <a:graphicData uri="http://schemas.openxmlformats.org/drawingml/2006/chart">

</xml_diff>